<commit_message>
[master] added third lab (first version)
</commit_message>
<xml_diff>
--- a/lab_02-dart_101_part_1/lab_02-dart_101_part_1.pptx
+++ b/lab_02-dart_101_part_1/lab_02-dart_101_part_1.pptx
@@ -246,7 +246,7 @@
           <a:p>
             <a:fld id="{81C4B3FE-0320-8142-8396-5C3025C019EC}" type="datetimeFigureOut">
               <a:rPr lang="en-IT" smtClean="0"/>
-              <a:t>03/01/22</a:t>
+              <a:t>04/01/22</a:t>
             </a:fld>
             <a:endParaRPr lang="en-IT"/>
           </a:p>
@@ -18615,15 +18615,11 @@
               <a:rPr lang="en-GB" dirty="0">
                 <a:hlinkClick r:id="rId2"/>
               </a:rPr>
-              <a:t>https://github.com/gcappon/bwthw/lab_02-dart_101_part_1</a:t>
-            </a:r>
-            <a:r>
+              <a:t>https://github.com/gcappon/bwthw/tree/master/lab_02-dart_101_part_1</a:t>
+            </a:r>
+            <a:br>
               <a:rPr lang="en-GB" dirty="0"/>
-              <a:t> </a:t>
-            </a:r>
-          </a:p>
-          <a:p>
-            <a:pPr lvl="1"/>
+            </a:br>
             <a:endParaRPr lang="en-GB" dirty="0"/>
           </a:p>
           <a:p>

</xml_diff>

<commit_message>
[master] added lesson 4 + lesson 5 skeleton. Fixed lesson 3
</commit_message>
<xml_diff>
--- a/lab_02-dart_101_part_1/lab_02-dart_101_part_1.pptx
+++ b/lab_02-dart_101_part_1/lab_02-dart_101_part_1.pptx
@@ -246,7 +246,7 @@
           <a:p>
             <a:fld id="{81C4B3FE-0320-8142-8396-5C3025C019EC}" type="datetimeFigureOut">
               <a:rPr lang="en-IT" smtClean="0"/>
-              <a:t>04/01/22</a:t>
+              <a:t>05/01/22</a:t>
             </a:fld>
             <a:endParaRPr lang="en-IT"/>
           </a:p>
@@ -18643,6 +18643,25 @@
               <a:buNone/>
             </a:pPr>
             <a:endParaRPr lang="en-GB" dirty="0"/>
+          </a:p>
+          <a:p>
+            <a:r>
+              <a:rPr lang="en-GB" dirty="0"/>
+              <a:t>Dart samples</a:t>
+            </a:r>
+          </a:p>
+          <a:p>
+            <a:pPr lvl="1"/>
+            <a:r>
+              <a:rPr lang="en-GB" dirty="0">
+                <a:hlinkClick r:id="rId4"/>
+              </a:rPr>
+              <a:t>https://dart.dev/samples</a:t>
+            </a:r>
+            <a:r>
+              <a:rPr lang="en-GB" dirty="0"/>
+              <a:t> </a:t>
+            </a:r>
           </a:p>
         </p:txBody>
       </p:sp>

</xml_diff>

<commit_message>
[master] fixed a typo on lesson 2. Added something on lesson 12
</commit_message>
<xml_diff>
--- a/lab_02-dart_101_part_1/lab_02-dart_101_part_1.pptx
+++ b/lab_02-dart_101_part_1/lab_02-dart_101_part_1.pptx
@@ -249,7 +249,7 @@
           <a:p>
             <a:fld id="{81C4B3FE-0320-8142-8396-5C3025C019EC}" type="datetimeFigureOut">
               <a:rPr lang="en-IT" smtClean="0"/>
-              <a:t>07/03/22</a:t>
+              <a:t>08/03/22</a:t>
             </a:fld>
             <a:endParaRPr lang="en-IT"/>
           </a:p>
@@ -14479,7 +14479,7 @@
               <a:rPr lang="en-GB" dirty="0">
                 <a:latin typeface="Courier" pitchFamily="2" charset="0"/>
               </a:rPr>
-              <a:t>  print(c is double); //This will print 'false'</a:t>
+              <a:t>  print(c is double); //This will print ‘true'</a:t>
             </a:r>
           </a:p>
           <a:p>
@@ -14490,8 +14490,17 @@
               <a:rPr lang="en-GB" dirty="0">
                 <a:latin typeface="Courier" pitchFamily="2" charset="0"/>
               </a:rPr>
-              <a:t>  print(c is! double); //This will print 'true’</a:t>
-            </a:r>
+              <a:t>  print(c is! double); //This will print </a:t>
+            </a:r>
+            <a:r>
+              <a:rPr lang="en-GB">
+                <a:latin typeface="Courier" pitchFamily="2" charset="0"/>
+              </a:rPr>
+              <a:t>‘false’</a:t>
+            </a:r>
+            <a:endParaRPr lang="en-GB" dirty="0">
+              <a:latin typeface="Courier" pitchFamily="2" charset="0"/>
+            </a:endParaRPr>
           </a:p>
           <a:p>
             <a:pPr marL="0" indent="0">

</xml_diff>

<commit_message>
[master] added extra lesson on oop. fixed typos.
</commit_message>
<xml_diff>
--- a/lab_02-dart_101_part_1/lab_02-dart_101_part_1.pptx
+++ b/lab_02-dart_101_part_1/lab_02-dart_101_part_1.pptx
@@ -11134,6 +11134,104 @@
           </a:p>
         </p:txBody>
       </p:sp>
+      <p:sp>
+        <p:nvSpPr>
+          <p:cNvPr id="5" name="TextBox 4">
+            <a:extLst>
+              <a:ext uri="{FF2B5EF4-FFF2-40B4-BE49-F238E27FC236}">
+                <a16:creationId xmlns:a16="http://schemas.microsoft.com/office/drawing/2014/main" id="{0783BA23-86A5-DD48-B239-C5779607A38F}"/>
+              </a:ext>
+            </a:extLst>
+          </p:cNvPr>
+          <p:cNvSpPr txBox="1"/>
+          <p:nvPr/>
+        </p:nvSpPr>
+        <p:spPr>
+          <a:xfrm>
+            <a:off x="10230098" y="5496833"/>
+            <a:ext cx="1265382" cy="369332"/>
+          </a:xfrm>
+          <a:prstGeom prst="rect">
+            <a:avLst/>
+          </a:prstGeom>
+        </p:spPr>
+        <p:style>
+          <a:lnRef idx="2">
+            <a:schemeClr val="accent6">
+              <a:shade val="50000"/>
+            </a:schemeClr>
+          </a:lnRef>
+          <a:fillRef idx="1">
+            <a:schemeClr val="accent6"/>
+          </a:fillRef>
+          <a:effectRef idx="0">
+            <a:schemeClr val="accent6"/>
+          </a:effectRef>
+          <a:fontRef idx="minor">
+            <a:schemeClr val="lt1"/>
+          </a:fontRef>
+        </p:style>
+        <p:txBody>
+          <a:bodyPr wrap="square" rtlCol="0" anchor="ctr">
+            <a:spAutoFit/>
+          </a:bodyPr>
+          <a:lstStyle/>
+          <a:p>
+            <a:pPr algn="ctr"/>
+            <a:r>
+              <a:rPr lang="en-IT" dirty="0">
+                <a:latin typeface="Palatino Linotype" panose="02040502050505030304" pitchFamily="18" charset="0"/>
+                <a:ea typeface="Palatino" pitchFamily="2" charset="77"/>
+              </a:rPr>
+              <a:t>BONUS</a:t>
+            </a:r>
+          </a:p>
+        </p:txBody>
+      </p:sp>
+      <p:sp>
+        <p:nvSpPr>
+          <p:cNvPr id="6" name="Right Brace 5">
+            <a:extLst>
+              <a:ext uri="{FF2B5EF4-FFF2-40B4-BE49-F238E27FC236}">
+                <a16:creationId xmlns:a16="http://schemas.microsoft.com/office/drawing/2014/main" id="{0D43009F-3693-774D-A515-4BD9FAD13149}"/>
+              </a:ext>
+            </a:extLst>
+          </p:cNvPr>
+          <p:cNvSpPr/>
+          <p:nvPr/>
+        </p:nvSpPr>
+        <p:spPr>
+          <a:xfrm>
+            <a:off x="9818255" y="4959927"/>
+            <a:ext cx="230909" cy="1496291"/>
+          </a:xfrm>
+          <a:prstGeom prst="rightBrace">
+            <a:avLst/>
+          </a:prstGeom>
+        </p:spPr>
+        <p:style>
+          <a:lnRef idx="1">
+            <a:schemeClr val="accent6"/>
+          </a:lnRef>
+          <a:fillRef idx="0">
+            <a:schemeClr val="accent6"/>
+          </a:fillRef>
+          <a:effectRef idx="0">
+            <a:schemeClr val="accent6"/>
+          </a:effectRef>
+          <a:fontRef idx="minor">
+            <a:schemeClr val="tx1"/>
+          </a:fontRef>
+        </p:style>
+        <p:txBody>
+          <a:bodyPr rtlCol="0" anchor="ctr"/>
+          <a:lstStyle/>
+          <a:p>
+            <a:pPr algn="ctr"/>
+            <a:endParaRPr lang="en-IT"/>
+          </a:p>
+        </p:txBody>
+      </p:sp>
     </p:spTree>
     <p:extLst>
       <p:ext uri="{BB962C8B-B14F-4D97-AF65-F5344CB8AC3E}">
@@ -12435,6 +12533,60 @@
               <a:t>28</a:t>
             </a:fld>
             <a:endParaRPr lang="en-GB"/>
+          </a:p>
+        </p:txBody>
+      </p:sp>
+      <p:sp>
+        <p:nvSpPr>
+          <p:cNvPr id="6" name="TextBox 5">
+            <a:extLst>
+              <a:ext uri="{FF2B5EF4-FFF2-40B4-BE49-F238E27FC236}">
+                <a16:creationId xmlns:a16="http://schemas.microsoft.com/office/drawing/2014/main" id="{5F6EE5A3-3796-3A40-A78A-318869DC824A}"/>
+              </a:ext>
+            </a:extLst>
+          </p:cNvPr>
+          <p:cNvSpPr txBox="1"/>
+          <p:nvPr/>
+        </p:nvSpPr>
+        <p:spPr>
+          <a:xfrm>
+            <a:off x="10714179" y="407381"/>
+            <a:ext cx="1265382" cy="369332"/>
+          </a:xfrm>
+          <a:prstGeom prst="rect">
+            <a:avLst/>
+          </a:prstGeom>
+        </p:spPr>
+        <p:style>
+          <a:lnRef idx="2">
+            <a:schemeClr val="accent6">
+              <a:shade val="50000"/>
+            </a:schemeClr>
+          </a:lnRef>
+          <a:fillRef idx="1">
+            <a:schemeClr val="accent6"/>
+          </a:fillRef>
+          <a:effectRef idx="0">
+            <a:schemeClr val="accent6"/>
+          </a:effectRef>
+          <a:fontRef idx="minor">
+            <a:schemeClr val="lt1"/>
+          </a:fontRef>
+        </p:style>
+        <p:txBody>
+          <a:bodyPr wrap="square" rtlCol="0" anchor="ctr">
+            <a:spAutoFit/>
+          </a:bodyPr>
+          <a:lstStyle/>
+          <a:p>
+            <a:pPr algn="ctr"/>
+            <a:r>
+              <a:rPr lang="en-IT" dirty="0">
+                <a:latin typeface="Palatino Linotype" panose="02040502050505030304" pitchFamily="18" charset="0"/>
+                <a:ea typeface="Palatino" pitchFamily="2" charset="77"/>
+              </a:rPr>
+              <a:t>BONUS</a:t>
+            </a:r>
           </a:p>
         </p:txBody>
       </p:sp>

</xml_diff>

<commit_message>
[ay-2022-23] updated lesson 2
</commit_message>
<xml_diff>
--- a/lab_02-dart_101_part_1/lab_02-dart_101_part_1.pptx
+++ b/lab_02-dart_101_part_1/lab_02-dart_101_part_1.pptx
@@ -249,7 +249,7 @@
           <a:p>
             <a:fld id="{81C4B3FE-0320-8142-8396-5C3025C019EC}" type="datetimeFigureOut">
               <a:rPr lang="en-IT" smtClean="0"/>
-              <a:t>08/03/22</a:t>
+              <a:t>15/11/22</a:t>
             </a:fld>
             <a:endParaRPr lang="en-IT"/>
           </a:p>
@@ -4586,7 +4586,7 @@
             </a:pPr>
             <a:r>
               <a:rPr lang="it-IT" sz="2800" dirty="0"/>
-              <a:t>A.Y. 2021-2022</a:t>
+              <a:t>A.Y. 2022-2023</a:t>
             </a:r>
           </a:p>
         </p:txBody>
@@ -8849,6 +8849,12 @@
           <a:p>
             <a:endParaRPr lang="en-IT" dirty="0"/>
           </a:p>
+          <a:p>
+            <a:r>
+              <a:rPr lang="en-IT" b="1" dirty="0"/>
+              <a:t>Advice: It is highly recommended to setup your own PC!</a:t>
+            </a:r>
+          </a:p>
         </p:txBody>
       </p:sp>
       <p:sp>
@@ -11131,104 +11137,6 @@
               <a:t>25</a:t>
             </a:fld>
             <a:endParaRPr lang="en-GB"/>
-          </a:p>
-        </p:txBody>
-      </p:sp>
-      <p:sp>
-        <p:nvSpPr>
-          <p:cNvPr id="5" name="TextBox 4">
-            <a:extLst>
-              <a:ext uri="{FF2B5EF4-FFF2-40B4-BE49-F238E27FC236}">
-                <a16:creationId xmlns:a16="http://schemas.microsoft.com/office/drawing/2014/main" id="{0783BA23-86A5-DD48-B239-C5779607A38F}"/>
-              </a:ext>
-            </a:extLst>
-          </p:cNvPr>
-          <p:cNvSpPr txBox="1"/>
-          <p:nvPr/>
-        </p:nvSpPr>
-        <p:spPr>
-          <a:xfrm>
-            <a:off x="10230098" y="5496833"/>
-            <a:ext cx="1265382" cy="369332"/>
-          </a:xfrm>
-          <a:prstGeom prst="rect">
-            <a:avLst/>
-          </a:prstGeom>
-        </p:spPr>
-        <p:style>
-          <a:lnRef idx="2">
-            <a:schemeClr val="accent6">
-              <a:shade val="50000"/>
-            </a:schemeClr>
-          </a:lnRef>
-          <a:fillRef idx="1">
-            <a:schemeClr val="accent6"/>
-          </a:fillRef>
-          <a:effectRef idx="0">
-            <a:schemeClr val="accent6"/>
-          </a:effectRef>
-          <a:fontRef idx="minor">
-            <a:schemeClr val="lt1"/>
-          </a:fontRef>
-        </p:style>
-        <p:txBody>
-          <a:bodyPr wrap="square" rtlCol="0" anchor="ctr">
-            <a:spAutoFit/>
-          </a:bodyPr>
-          <a:lstStyle/>
-          <a:p>
-            <a:pPr algn="ctr"/>
-            <a:r>
-              <a:rPr lang="en-IT" dirty="0">
-                <a:latin typeface="Palatino Linotype" panose="02040502050505030304" pitchFamily="18" charset="0"/>
-                <a:ea typeface="Palatino" pitchFamily="2" charset="77"/>
-              </a:rPr>
-              <a:t>BONUS</a:t>
-            </a:r>
-          </a:p>
-        </p:txBody>
-      </p:sp>
-      <p:sp>
-        <p:nvSpPr>
-          <p:cNvPr id="6" name="Right Brace 5">
-            <a:extLst>
-              <a:ext uri="{FF2B5EF4-FFF2-40B4-BE49-F238E27FC236}">
-                <a16:creationId xmlns:a16="http://schemas.microsoft.com/office/drawing/2014/main" id="{0D43009F-3693-774D-A515-4BD9FAD13149}"/>
-              </a:ext>
-            </a:extLst>
-          </p:cNvPr>
-          <p:cNvSpPr/>
-          <p:nvPr/>
-        </p:nvSpPr>
-        <p:spPr>
-          <a:xfrm>
-            <a:off x="9818255" y="4959927"/>
-            <a:ext cx="230909" cy="1496291"/>
-          </a:xfrm>
-          <a:prstGeom prst="rightBrace">
-            <a:avLst/>
-          </a:prstGeom>
-        </p:spPr>
-        <p:style>
-          <a:lnRef idx="1">
-            <a:schemeClr val="accent6"/>
-          </a:lnRef>
-          <a:fillRef idx="0">
-            <a:schemeClr val="accent6"/>
-          </a:fillRef>
-          <a:effectRef idx="0">
-            <a:schemeClr val="accent6"/>
-          </a:effectRef>
-          <a:fontRef idx="minor">
-            <a:schemeClr val="tx1"/>
-          </a:fontRef>
-        </p:style>
-        <p:txBody>
-          <a:bodyPr rtlCol="0" anchor="ctr"/>
-          <a:lstStyle/>
-          <a:p>
-            <a:pPr algn="ctr"/>
-            <a:endParaRPr lang="en-IT"/>
           </a:p>
         </p:txBody>
       </p:sp>

</xml_diff>

<commit_message>
[master] corrected few typos
</commit_message>
<xml_diff>
--- a/lab_02-dart_101_part_1/lab_02-dart_101_part_1.pptx
+++ b/lab_02-dart_101_part_1/lab_02-dart_101_part_1.pptx
@@ -249,7 +249,7 @@
           <a:p>
             <a:fld id="{81C4B3FE-0320-8142-8396-5C3025C019EC}" type="datetimeFigureOut">
               <a:rPr lang="en-IT" smtClean="0"/>
-              <a:t>1/30/24</a:t>
+              <a:t>3/5/24</a:t>
             </a:fld>
             <a:endParaRPr lang="en-IT"/>
           </a:p>
@@ -7027,7 +7027,7 @@
           <a:p>
             <a:r>
               <a:rPr lang="en-GB" dirty="0"/>
-              <a:t>As we saw, it is possible to interpolate an expression inside a String using </a:t>
+              <a:t>It is possible to interpolate an expression inside a String using </a:t>
             </a:r>
             <a:r>
               <a:rPr lang="en-GB" dirty="0">
@@ -7954,12 +7954,16 @@
           <a:lstStyle/>
           <a:p>
             <a:r>
-              <a:rPr lang="en-GB"/>
-              <a:t>List - M</a:t>
+              <a:rPr lang="en-GB" dirty="0"/>
+              <a:t>List - m</a:t>
+            </a:r>
+            <a:r>
+              <a:rPr lang="en-IT"/>
+              <a:t>ap</a:t>
             </a:r>
             <a:r>
               <a:rPr lang="en-IT" dirty="0"/>
-              <a:t>ap() method</a:t>
+              <a:t>() method</a:t>
             </a:r>
           </a:p>
         </p:txBody>
@@ -8004,7 +8008,7 @@
             </a:r>
             <a:r>
               <a:rPr lang="en-GB" dirty="0"/>
-              <a:t> type is expressed by the </a:t>
+              <a:t> type is the </a:t>
             </a:r>
             <a:r>
               <a:rPr lang="en-GB" dirty="0">

</xml_diff>

<commit_message>
updated lab 1,2,3 to #17
</commit_message>
<xml_diff>
--- a/lab_02-dart_101_part_1/lab_02-dart_101_part_1.pptx
+++ b/lab_02-dart_101_part_1/lab_02-dart_101_part_1.pptx
@@ -249,7 +249,7 @@
           <a:p>
             <a:fld id="{81C4B3FE-0320-8142-8396-5C3025C019EC}" type="datetimeFigureOut">
               <a:rPr lang="en-IT" smtClean="0"/>
-              <a:t>3/5/24</a:t>
+              <a:t>2/11/25</a:t>
             </a:fld>
             <a:endParaRPr lang="en-IT"/>
           </a:p>
@@ -4155,7 +4155,9 @@
           <a:lstStyle>
             <a:lvl1pPr marL="0" indent="0" algn="ctr">
               <a:buNone/>
-              <a:defRPr sz="4800" b="1"/>
+              <a:defRPr sz="4800" b="1">
+                <a:latin typeface="Aptos" panose="020B0004020202020204" pitchFamily="34" charset="0"/>
+              </a:defRPr>
             </a:lvl1pPr>
             <a:lvl2pPr marL="457200" indent="0" algn="ctr">
               <a:buNone/>
@@ -4241,7 +4243,9 @@
           <a:lstStyle/>
           <a:p>
             <a:pPr algn="ctr"/>
-            <a:endParaRPr lang="en-GB" dirty="0"/>
+            <a:endParaRPr lang="en-GB" dirty="0">
+              <a:latin typeface="Aptos" panose="020B0004020202020204" pitchFamily="34" charset="0"/>
+            </a:endParaRPr>
           </a:p>
         </p:txBody>
       </p:sp>
@@ -4291,7 +4295,9 @@
           <a:lstStyle/>
           <a:p>
             <a:pPr algn="ctr"/>
-            <a:endParaRPr lang="en-GB" dirty="0"/>
+            <a:endParaRPr lang="en-GB" dirty="0">
+              <a:latin typeface="Aptos" panose="020B0004020202020204" pitchFamily="34" charset="0"/>
+            </a:endParaRPr>
           </a:p>
         </p:txBody>
       </p:sp>
@@ -4337,36 +4343,52 @@
           </a:lstStyle>
           <a:p>
             <a:r>
-              <a:rPr lang="it-IT" sz="2800" b="0" dirty="0" err="1"/>
+              <a:rPr lang="it-IT" sz="2800" b="0" dirty="0" err="1">
+                <a:latin typeface="Aptos" panose="020B0004020202020204" pitchFamily="34" charset="0"/>
+              </a:rPr>
               <a:t>Biomedical</a:t>
             </a:r>
             <a:r>
-              <a:rPr lang="it-IT" sz="2800" b="0" dirty="0"/>
+              <a:rPr lang="it-IT" sz="2800" b="0" dirty="0">
+                <a:latin typeface="Aptos" panose="020B0004020202020204" pitchFamily="34" charset="0"/>
+              </a:rPr>
               <a:t> </a:t>
             </a:r>
             <a:r>
-              <a:rPr lang="it-IT" sz="2800" b="0" dirty="0" err="1"/>
+              <a:rPr lang="it-IT" sz="2800" b="0" dirty="0" err="1">
+                <a:latin typeface="Aptos" panose="020B0004020202020204" pitchFamily="34" charset="0"/>
+              </a:rPr>
               <a:t>Wearable</a:t>
             </a:r>
             <a:r>
-              <a:rPr lang="it-IT" sz="2800" b="0" dirty="0"/>
+              <a:rPr lang="it-IT" sz="2800" b="0" dirty="0">
+                <a:latin typeface="Aptos" panose="020B0004020202020204" pitchFamily="34" charset="0"/>
+              </a:rPr>
               <a:t> Technologies </a:t>
             </a:r>
           </a:p>
           <a:p>
             <a:r>
-              <a:rPr lang="it-IT" sz="2800" b="0" dirty="0"/>
+              <a:rPr lang="it-IT" sz="2800" b="0" dirty="0">
+                <a:latin typeface="Aptos" panose="020B0004020202020204" pitchFamily="34" charset="0"/>
+              </a:rPr>
               <a:t>for Healthcare and </a:t>
             </a:r>
             <a:r>
-              <a:rPr lang="it-IT" sz="2800" b="0" dirty="0" err="1"/>
+              <a:rPr lang="it-IT" sz="2800" b="0" dirty="0" err="1">
+                <a:latin typeface="Aptos" panose="020B0004020202020204" pitchFamily="34" charset="0"/>
+              </a:rPr>
               <a:t>Wellbeing</a:t>
             </a:r>
             <a:r>
-              <a:rPr lang="it-IT" sz="2800" b="0" dirty="0"/>
+              <a:rPr lang="it-IT" sz="2800" b="0" dirty="0">
+                <a:latin typeface="Aptos" panose="020B0004020202020204" pitchFamily="34" charset="0"/>
+              </a:rPr>
               <a:t>  </a:t>
             </a:r>
-            <a:endParaRPr lang="en-GB" sz="2800" b="0" dirty="0"/>
+            <a:endParaRPr lang="en-GB" sz="2800" b="0" dirty="0">
+              <a:latin typeface="Aptos" panose="020B0004020202020204" pitchFamily="34" charset="0"/>
+            </a:endParaRPr>
           </a:p>
         </p:txBody>
       </p:sp>
@@ -4417,8 +4439,10 @@
               </a:spcAft>
             </a:pPr>
             <a:r>
-              <a:rPr lang="it-IT" sz="2800" dirty="0"/>
-              <a:t>A.Y. 2023-2024</a:t>
+              <a:rPr lang="it-IT" sz="2800" dirty="0">
+                <a:latin typeface="Aptos" panose="020B0004020202020204" pitchFamily="34" charset="0"/>
+              </a:rPr>
+              <a:t>A.Y. 2024-2025</a:t>
             </a:r>
           </a:p>
         </p:txBody>
@@ -4457,7 +4481,7 @@
                 <a:effectLst/>
                 <a:uLnTx/>
                 <a:uFillTx/>
-                <a:latin typeface="Palatino Linotype" panose="02040502050505030304" pitchFamily="18" charset="0"/>
+                <a:latin typeface="Aptos" panose="020B0004020202020204" pitchFamily="34" charset="0"/>
                 <a:ea typeface="+mj-ea"/>
                 <a:cs typeface="+mj-cs"/>
               </a:rPr>
@@ -4474,7 +4498,7 @@
                 <a:effectLst/>
                 <a:uLnTx/>
                 <a:uFillTx/>
-                <a:latin typeface="Palatino Linotype" panose="02040502050505030304" pitchFamily="18" charset="0"/>
+                <a:latin typeface="Aptos" panose="020B0004020202020204" pitchFamily="34" charset="0"/>
                 <a:ea typeface="+mj-ea"/>
                 <a:cs typeface="+mj-cs"/>
               </a:rPr>
@@ -4491,7 +4515,7 @@
                 <a:effectLst/>
                 <a:uLnTx/>
                 <a:uFillTx/>
-                <a:latin typeface="Palatino Linotype" panose="02040502050505030304" pitchFamily="18" charset="0"/>
+                <a:latin typeface="Aptos" panose="020B0004020202020204" pitchFamily="34" charset="0"/>
                 <a:ea typeface="+mj-ea"/>
                 <a:cs typeface="+mj-cs"/>
               </a:rPr>
@@ -4507,7 +4531,7 @@
                 <a:effectLst/>
                 <a:uLnTx/>
                 <a:uFillTx/>
-                <a:latin typeface="Palatino Linotype" panose="02040502050505030304" pitchFamily="18" charset="0"/>
+                <a:latin typeface="Aptos" panose="020B0004020202020204" pitchFamily="34" charset="0"/>
                 <a:ea typeface="+mj-ea"/>
                 <a:cs typeface="+mj-cs"/>
               </a:rPr>
@@ -4524,7 +4548,7 @@
                 <a:effectLst/>
                 <a:uLnTx/>
                 <a:uFillTx/>
-                <a:latin typeface="Palatino Linotype" panose="02040502050505030304" pitchFamily="18" charset="0"/>
+                <a:latin typeface="Aptos" panose="020B0004020202020204" pitchFamily="34" charset="0"/>
                 <a:ea typeface="+mj-ea"/>
                 <a:cs typeface="+mj-cs"/>
               </a:rPr>
@@ -4541,13 +4565,15 @@
                 <a:effectLst/>
                 <a:uLnTx/>
                 <a:uFillTx/>
-                <a:latin typeface="Palatino Linotype" panose="02040502050505030304" pitchFamily="18" charset="0"/>
+                <a:latin typeface="Aptos" panose="020B0004020202020204" pitchFamily="34" charset="0"/>
                 <a:ea typeface="+mj-ea"/>
                 <a:cs typeface="+mj-cs"/>
               </a:rPr>
               <a:t>Engineering</a:t>
             </a:r>
-            <a:endParaRPr lang="en-GB" sz="1100" cap="small" baseline="0" dirty="0"/>
+            <a:endParaRPr lang="en-GB" sz="1100" cap="small" baseline="0" dirty="0">
+              <a:latin typeface="Aptos" panose="020B0004020202020204" pitchFamily="34" charset="0"/>
+            </a:endParaRPr>
           </a:p>
         </p:txBody>
       </p:sp>
@@ -4657,7 +4683,9 @@
           </a:bodyPr>
           <a:lstStyle>
             <a:lvl1pPr>
-              <a:defRPr sz="3200"/>
+              <a:defRPr sz="3200">
+                <a:latin typeface="Aptos" panose="020B0004020202020204" pitchFamily="34" charset="0"/>
+              </a:defRPr>
             </a:lvl1pPr>
           </a:lstStyle>
           <a:p>
@@ -5057,12 +5085,14 @@
                     <a:tint val="75000"/>
                   </a:schemeClr>
                 </a:solidFill>
+                <a:latin typeface="Aptos" panose="020B0004020202020204" pitchFamily="34" charset="0"/>
               </a:defRPr>
             </a:lvl1pPr>
           </a:lstStyle>
           <a:p>
             <a:fld id="{31DE2C5B-556E-47B8-A792-024C2FCA4ACC}" type="slidenum">
               <a:rPr lang="en-GB" smtClean="0"/>
+              <a:pPr/>
               <a:t>‹#›</a:t>
             </a:fld>
             <a:endParaRPr lang="en-GB"/>
@@ -5098,7 +5128,7 @@
           <a:solidFill>
             <a:schemeClr val="tx1"/>
           </a:solidFill>
-          <a:latin typeface="Palatino Linotype" panose="02040502050505030304" pitchFamily="18" charset="0"/>
+          <a:latin typeface="Aptos" panose="020B0004020202020204" pitchFamily="34" charset="0"/>
           <a:ea typeface="+mj-ea"/>
           <a:cs typeface="+mj-cs"/>
         </a:defRPr>
@@ -5121,7 +5151,7 @@
           <a:solidFill>
             <a:schemeClr val="tx1"/>
           </a:solidFill>
-          <a:latin typeface="Palatino Linotype" panose="02040502050505030304" pitchFamily="18" charset="0"/>
+          <a:latin typeface="Aptos" panose="020B0004020202020204" pitchFamily="34" charset="0"/>
           <a:ea typeface="+mn-ea"/>
           <a:cs typeface="+mn-cs"/>
         </a:defRPr>
@@ -5142,7 +5172,7 @@
           <a:solidFill>
             <a:schemeClr val="tx1"/>
           </a:solidFill>
-          <a:latin typeface="Palatino Linotype" panose="02040502050505030304" pitchFamily="18" charset="0"/>
+          <a:latin typeface="Aptos" panose="020B0004020202020204" pitchFamily="34" charset="0"/>
           <a:ea typeface="+mn-ea"/>
           <a:cs typeface="+mn-cs"/>
         </a:defRPr>
@@ -5163,7 +5193,7 @@
           <a:solidFill>
             <a:schemeClr val="tx1"/>
           </a:solidFill>
-          <a:latin typeface="Palatino Linotype" panose="02040502050505030304" pitchFamily="18" charset="0"/>
+          <a:latin typeface="Aptos" panose="020B0004020202020204" pitchFamily="34" charset="0"/>
           <a:ea typeface="+mn-ea"/>
           <a:cs typeface="+mn-cs"/>
         </a:defRPr>
@@ -5184,7 +5214,7 @@
           <a:solidFill>
             <a:schemeClr val="tx1"/>
           </a:solidFill>
-          <a:latin typeface="Palatino Linotype" panose="02040502050505030304" pitchFamily="18" charset="0"/>
+          <a:latin typeface="Aptos" panose="020B0004020202020204" pitchFamily="34" charset="0"/>
           <a:ea typeface="+mn-ea"/>
           <a:cs typeface="+mn-cs"/>
         </a:defRPr>
@@ -5205,7 +5235,7 @@
           <a:solidFill>
             <a:schemeClr val="tx1"/>
           </a:solidFill>
-          <a:latin typeface="Palatino Linotype" panose="02040502050505030304" pitchFamily="18" charset="0"/>
+          <a:latin typeface="Aptos" panose="020B0004020202020204" pitchFamily="34" charset="0"/>
           <a:ea typeface="+mn-ea"/>
           <a:cs typeface="+mn-cs"/>
         </a:defRPr>
@@ -5840,6 +5870,7 @@
             </a:pPr>
             <a:r>
               <a:rPr lang="en-IT" sz="1600" dirty="0">
+                <a:latin typeface="Aptos" panose="020B0004020202020204" pitchFamily="34" charset="0"/>
                 <a:ea typeface="Palatino" pitchFamily="2" charset="77"/>
               </a:rPr>
               <a:t>Full example in lab_02-dart_101_part_1/03-null_safety.dart</a:t>
@@ -6579,12 +6610,14 @@
             </a:pPr>
             <a:r>
               <a:rPr lang="en-IT" sz="1600" b="1" dirty="0">
+                <a:latin typeface="Aptos" panose="020B0004020202020204" pitchFamily="34" charset="0"/>
                 <a:ea typeface="Palatino" pitchFamily="2" charset="77"/>
               </a:rPr>
               <a:t>Note</a:t>
             </a:r>
             <a:r>
               <a:rPr lang="en-IT" sz="1600" dirty="0">
+                <a:latin typeface="Aptos" panose="020B0004020202020204" pitchFamily="34" charset="0"/>
                 <a:ea typeface="Palatino" pitchFamily="2" charset="77"/>
               </a:rPr>
               <a:t>: No need to memorize these numbers!	</a:t>
@@ -8652,6 +8685,7 @@
             </a:pPr>
             <a:r>
               <a:rPr lang="en-IT" sz="1600" dirty="0">
+                <a:latin typeface="Aptos" panose="020B0004020202020204" pitchFamily="34" charset="0"/>
                 <a:ea typeface="Palatino" pitchFamily="2" charset="77"/>
               </a:rPr>
               <a:t>Full example in lab_02-dart_101_part_1/04-built_in_types.dart</a:t>
@@ -11283,6 +11317,7 @@
             </a:pPr>
             <a:r>
               <a:rPr lang="en-IT" sz="1600" dirty="0">
+                <a:latin typeface="Aptos" panose="020B0004020202020204" pitchFamily="34" charset="0"/>
                 <a:ea typeface="Palatino" pitchFamily="2" charset="77"/>
               </a:rPr>
               <a:t>Full example in lab_02-dart_101_part_1/05-functions.dart</a:t>
@@ -11365,7 +11400,7 @@
             <a:pPr algn="ctr"/>
             <a:r>
               <a:rPr lang="en-IT" dirty="0">
-                <a:latin typeface="Palatino Linotype" panose="02040502050505030304" pitchFamily="18" charset="0"/>
+                <a:latin typeface="Aptos" panose="020B0004020202020204" pitchFamily="34" charset="0"/>
                 <a:ea typeface="Palatino" pitchFamily="2" charset="77"/>
               </a:rPr>
               <a:t>BONUS</a:t>
@@ -13664,6 +13699,7 @@
             </a:pPr>
             <a:r>
               <a:rPr lang="en-IT" sz="1600" dirty="0">
+                <a:latin typeface="Aptos" panose="020B0004020202020204" pitchFamily="34" charset="0"/>
                 <a:ea typeface="Palatino" pitchFamily="2" charset="77"/>
               </a:rPr>
               <a:t>Full example in lab_02-dart_101_part_1/06-operators.dart</a:t>
@@ -15709,16 +15745,29 @@
             </a:pPr>
             <a:r>
               <a:rPr lang="en-IT" sz="1600" b="1" dirty="0">
+                <a:latin typeface="Aptos" panose="020B0004020202020204" pitchFamily="34" charset="0"/>
                 <a:ea typeface="Palatino" pitchFamily="2" charset="77"/>
               </a:rPr>
               <a:t>Note:</a:t>
             </a:r>
             <a:r>
               <a:rPr lang="en-IT" sz="1600" dirty="0">
+                <a:latin typeface="Aptos" panose="020B0004020202020204" pitchFamily="34" charset="0"/>
                 <a:ea typeface="Palatino" pitchFamily="2" charset="77"/>
               </a:rPr>
-              <a:t> Use for over while when you know how many iterations are needed!</a:t>
-            </a:r>
+              <a:t> Use for over while when you know how many iterations </a:t>
+            </a:r>
+            <a:r>
+              <a:rPr lang="en-IT" sz="1600">
+                <a:latin typeface="Aptos" panose="020B0004020202020204" pitchFamily="34" charset="0"/>
+                <a:ea typeface="Palatino" pitchFamily="2" charset="77"/>
+              </a:rPr>
+              <a:t>are needed</a:t>
+            </a:r>
+            <a:endParaRPr lang="en-IT" sz="1600" dirty="0">
+              <a:latin typeface="Aptos" panose="020B0004020202020204" pitchFamily="34" charset="0"/>
+              <a:ea typeface="Palatino" pitchFamily="2" charset="77"/>
+            </a:endParaRPr>
           </a:p>
         </p:txBody>
       </p:sp>
@@ -16235,16 +16284,29 @@
             </a:pPr>
             <a:r>
               <a:rPr lang="en-IT" sz="1600" b="1" dirty="0">
+                <a:latin typeface="Aptos" panose="020B0004020202020204" pitchFamily="34" charset="0"/>
                 <a:ea typeface="Palatino" pitchFamily="2" charset="77"/>
               </a:rPr>
               <a:t>Note:</a:t>
             </a:r>
             <a:r>
               <a:rPr lang="en-IT" sz="1600" dirty="0">
+                <a:latin typeface="Aptos" panose="020B0004020202020204" pitchFamily="34" charset="0"/>
                 <a:ea typeface="Palatino" pitchFamily="2" charset="77"/>
               </a:rPr>
-              <a:t> Use for over do-while when you know how many iterations are needed!</a:t>
-            </a:r>
+              <a:t> Use for over do-while when you know how many iterations </a:t>
+            </a:r>
+            <a:r>
+              <a:rPr lang="en-IT" sz="1600">
+                <a:latin typeface="Aptos" panose="020B0004020202020204" pitchFamily="34" charset="0"/>
+                <a:ea typeface="Palatino" pitchFamily="2" charset="77"/>
+              </a:rPr>
+              <a:t>are needed</a:t>
+            </a:r>
+            <a:endParaRPr lang="en-IT" sz="1600" dirty="0">
+              <a:latin typeface="Aptos" panose="020B0004020202020204" pitchFamily="34" charset="0"/>
+              <a:ea typeface="Palatino" pitchFamily="2" charset="77"/>
+            </a:endParaRPr>
           </a:p>
         </p:txBody>
       </p:sp>
@@ -18103,6 +18165,7 @@
             </a:pPr>
             <a:r>
               <a:rPr lang="en-IT" sz="1600" dirty="0">
+                <a:latin typeface="Aptos" panose="020B0004020202020204" pitchFamily="34" charset="0"/>
                 <a:ea typeface="Palatino" pitchFamily="2" charset="77"/>
               </a:rPr>
               <a:t>Full example in lab_02-dart_101_part_1/07-control_flow.dart</a:t>
@@ -20703,6 +20766,7 @@
             </a:pPr>
             <a:r>
               <a:rPr lang="en-IT" sz="1600" dirty="0">
+                <a:latin typeface="Aptos" panose="020B0004020202020204" pitchFamily="34" charset="0"/>
                 <a:ea typeface="Palatino" pitchFamily="2" charset="77"/>
               </a:rPr>
               <a:t>Full example in lab_02-dart_101_part_1/01-hello_world.dart</a:t>
@@ -21413,6 +21477,7 @@
             </a:pPr>
             <a:r>
               <a:rPr lang="en-IT" sz="1600" dirty="0">
+                <a:latin typeface="Aptos" panose="020B0004020202020204" pitchFamily="34" charset="0"/>
                 <a:ea typeface="Palatino" pitchFamily="2" charset="77"/>
               </a:rPr>
               <a:t>Full example in lab_02-dart_101_part_1/02-variables.dart</a:t>

</xml_diff>